<commit_message>
Updated README & PowerPoint
</commit_message>
<xml_diff>
--- a/docs/Assignment.pptx
+++ b/docs/Assignment.pptx
@@ -107,6 +107,11 @@
       </a:defRPr>
     </a:lvl9pPr>
   </p:defaultTextStyle>
+  <p:extLst>
+    <p:ext uri="{EFAFB233-063F-42B5-8137-9DF3F51BA10A}">
+      <p15:sldGuideLst xmlns:p15="http://schemas.microsoft.com/office/powerpoint/2012/main"/>
+    </p:ext>
+  </p:extLst>
 </p:presentation>
 </file>
 
@@ -4329,7 +4334,34 @@
           <a:p>
             <a:r>
               <a:rPr lang="en-CH" dirty="0"/>
+              <a:t>- Improve Time management</a:t>
+            </a:r>
+          </a:p>
+          <a:p>
+            <a:r>
+              <a:rPr lang="en-CH" dirty="0"/>
+              <a:t>- better work distribution</a:t>
+            </a:r>
+          </a:p>
+          <a:p>
+            <a:endParaRPr lang="en-CH" dirty="0"/>
+          </a:p>
+          <a:p>
+            <a:r>
+              <a:rPr lang="en-CH" dirty="0"/>
               <a:t>technicality</a:t>
+            </a:r>
+          </a:p>
+          <a:p>
+            <a:r>
+              <a:rPr lang="en-CH" dirty="0"/>
+              <a:t>- Work on ‘dev’ branch</a:t>
+            </a:r>
+          </a:p>
+          <a:p>
+            <a:r>
+              <a:rPr lang="en-CH" dirty="0"/>
+              <a:t>- know your skills</a:t>
             </a:r>
             <a:endParaRPr lang="de-CH" dirty="0"/>
           </a:p>

</xml_diff>